<commit_message>
added links to powerpoint
</commit_message>
<xml_diff>
--- a/Intro to Python Flask.pptx
+++ b/Intro to Python Flask.pptx
@@ -3476,21 +3476,8 @@
           <a:p>
             <a:r>
               <a:rPr lang="en-US" sz="2800" dirty="0" smtClean="0"/>
-              <a:t>For </a:t>
-            </a:r>
-            <a:r>
-              <a:rPr lang="en-US" sz="2800" dirty="0" smtClean="0"/>
-              <a:t>someone who </a:t>
-            </a:r>
-            <a:r>
-              <a:rPr lang="en-US" sz="2800" dirty="0" smtClean="0"/>
-              <a:t>has completed an intro programming class in C++ or a similar </a:t>
-            </a:r>
-            <a:r>
-              <a:rPr lang="en-US" sz="2800" dirty="0" smtClean="0"/>
-              <a:t>language</a:t>
-            </a:r>
-            <a:endParaRPr lang="en-US" sz="2800" dirty="0" smtClean="0"/>
+              <a:t>For someone who has completed an intro programming class in C++ or a similar language</a:t>
+            </a:r>
           </a:p>
           <a:p>
             <a:endParaRPr lang="en-US" sz="2800" dirty="0"/>
@@ -3752,7 +3739,9 @@
               <a:t>Download the </a:t>
             </a:r>
             <a:r>
-              <a:rPr lang="en-US" i="1" dirty="0" smtClean="0"/>
+              <a:rPr lang="en-US" dirty="0" smtClean="0">
+                <a:hlinkClick r:id="rId2"/>
+              </a:rPr>
               <a:t>starter code</a:t>
             </a:r>
             <a:r>
@@ -3894,15 +3883,19 @@
               <a:t>See </a:t>
             </a:r>
             <a:r>
-              <a:rPr lang="en-US" sz="2400" i="1" dirty="0" smtClean="0"/>
-              <a:t>example code </a:t>
+              <a:rPr lang="en-US" sz="2400" dirty="0" smtClean="0">
+                <a:hlinkClick r:id="rId2"/>
+              </a:rPr>
+              <a:t>example code</a:t>
             </a:r>
             <a:r>
               <a:rPr lang="en-US" sz="2400" dirty="0" smtClean="0"/>
-              <a:t>to see how python classes work. Do the following as files, of course, using the </a:t>
-            </a:r>
-            <a:r>
-              <a:rPr lang="en-US" sz="2400" i="1" dirty="0" smtClean="0"/>
+              <a:t> to see how python classes work. Do the following as files, of course, using the </a:t>
+            </a:r>
+            <a:r>
+              <a:rPr lang="en-US" sz="2400" dirty="0" smtClean="0">
+                <a:hlinkClick r:id="rId3"/>
+              </a:rPr>
               <a:t>starter script</a:t>
             </a:r>
             <a:r>
@@ -4170,15 +4163,7 @@
             </a:r>
             <a:r>
               <a:rPr lang="en-US" dirty="0" smtClean="0"/>
-              <a:t>omeone </a:t>
-            </a:r>
-            <a:r>
-              <a:rPr lang="en-US" dirty="0" smtClean="0"/>
-              <a:t>who loads a </a:t>
-            </a:r>
-            <a:r>
-              <a:rPr lang="en-US" dirty="0" smtClean="0"/>
-              <a:t>website.</a:t>
+              <a:t>omeone who loads a website.</a:t>
             </a:r>
           </a:p>
           <a:p>
@@ -4369,19 +4354,7 @@
           <a:p>
             <a:r>
               <a:rPr lang="en-US" dirty="0" smtClean="0"/>
-              <a:t>Flask </a:t>
-            </a:r>
-            <a:r>
-              <a:rPr lang="en-US" dirty="0" smtClean="0"/>
-              <a:t>makes the </a:t>
-            </a:r>
-            <a:r>
-              <a:rPr lang="en-US" dirty="0" smtClean="0"/>
-              <a:t>s</a:t>
-            </a:r>
-            <a:r>
-              <a:rPr lang="en-US" dirty="0" smtClean="0"/>
-              <a:t>erver work</a:t>
+              <a:t>Flask makes the server work</a:t>
             </a:r>
             <a:endParaRPr lang="en-US" dirty="0"/>
           </a:p>
@@ -4412,15 +4385,7 @@
             </a:pPr>
             <a:r>
               <a:rPr lang="en-US" dirty="0" smtClean="0"/>
-              <a:t>As a web framework, flask provides us the basic tools to define </a:t>
-            </a:r>
-            <a:r>
-              <a:rPr lang="en-US" dirty="0" smtClean="0"/>
-              <a:t>server behavior </a:t>
-            </a:r>
-            <a:r>
-              <a:rPr lang="en-US" dirty="0" smtClean="0"/>
-              <a:t>based on incoming web requests to a server. </a:t>
+              <a:t>As a web framework, flask provides us the basic tools to define server behavior based on incoming web requests to a server. </a:t>
             </a:r>
             <a:endParaRPr lang="en-US" dirty="0"/>
           </a:p>
@@ -4527,13 +4492,8 @@
             </a:pPr>
             <a:r>
               <a:rPr lang="en-US" dirty="0" smtClean="0"/>
-              <a:t>Since flask is ran on a server, a flask program is not a normal, sequential program. You don’t run the program from top to bottom, and something in line 50 doesn’t necessarily happen before line 150</a:t>
-            </a:r>
-            <a:r>
-              <a:rPr lang="en-US" dirty="0" smtClean="0"/>
-              <a:t>.</a:t>
-            </a:r>
-            <a:endParaRPr lang="en-US" dirty="0" smtClean="0"/>
+              <a:t>Since flask is ran on a server, a flask program is not a normal, sequential program. You don’t run the program from top to bottom, and something in line 50 doesn’t necessarily happen before line 150.</a:t>
+            </a:r>
           </a:p>
           <a:p>
             <a:pPr lvl="1">
@@ -4564,7 +4524,6 @@
               <a:rPr lang="en-US" dirty="0" smtClean="0"/>
               <a:t>/oranges. When someone accesses apples, pictures of apples are sent to the client (meaning that apples are shown in the client’s browser). The opposite happens for oranges. </a:t>
             </a:r>
-            <a:endParaRPr lang="en-US" dirty="0" smtClean="0"/>
           </a:p>
           <a:p>
             <a:pPr lvl="1">
@@ -4577,13 +4536,8 @@
             </a:pPr>
             <a:r>
               <a:rPr lang="en-US" dirty="0" smtClean="0"/>
-              <a:t>When </a:t>
-            </a:r>
-            <a:r>
-              <a:rPr lang="en-US" dirty="0" smtClean="0"/>
-              <a:t>the client requests the oranges page, the code for oranges executes. It doesn’t matter if the apples code is before or after the oranges code. </a:t>
-            </a:r>
-            <a:endParaRPr lang="en-US" dirty="0" smtClean="0"/>
+              <a:t>When the client requests the oranges page, the code for oranges executes. It doesn’t matter if the apples code is before or after the oranges code. </a:t>
+            </a:r>
           </a:p>
           <a:p>
             <a:pPr lvl="1">
@@ -4727,13 +4681,8 @@
             </a:r>
             <a:r>
               <a:rPr lang="en-US" dirty="0" smtClean="0"/>
-              <a:t>/oranges, and provides the code that is executed when a client requests the oranges URL</a:t>
-            </a:r>
-            <a:r>
-              <a:rPr lang="en-US" dirty="0" smtClean="0"/>
-              <a:t>.</a:t>
-            </a:r>
-            <a:endParaRPr lang="en-US" dirty="0" smtClean="0"/>
+              <a:t>/oranges, and provides the code that is executed when a client requests the oranges URL.</a:t>
+            </a:r>
           </a:p>
         </p:txBody>
       </p:sp>
@@ -4979,11 +4928,7 @@
             </a:r>
             <a:r>
               <a:rPr lang="en-US" dirty="0" smtClean="0"/>
-              <a:t> is something you don’t see in regular python, and is specific to Flask</a:t>
-            </a:r>
-            <a:r>
-              <a:rPr lang="en-US" dirty="0" smtClean="0"/>
-              <a:t>. </a:t>
+              <a:t> is something you don’t see in regular python, and is specific to Flask. </a:t>
             </a:r>
             <a:r>
               <a:rPr lang="en-US" b="1" dirty="0" smtClean="0"/>
@@ -5110,8 +5055,13 @@
             </a:pPr>
             <a:r>
               <a:rPr lang="en-US" dirty="0" smtClean="0"/>
-              <a:t>Intro to Flask</a:t>
-            </a:r>
+              <a:t>Intro to </a:t>
+            </a:r>
+            <a:r>
+              <a:rPr lang="en-US" dirty="0" smtClean="0"/>
+              <a:t>Flask</a:t>
+            </a:r>
+            <a:endParaRPr lang="en-US" dirty="0" smtClean="0"/>
           </a:p>
           <a:p>
             <a:endParaRPr lang="en-US" dirty="0"/>
@@ -5381,13 +5331,8 @@
             </a:r>
             <a:r>
               <a:rPr lang="en-US" dirty="0" smtClean="0"/>
-              <a:t> libraries are easily installed using pip (a terminal/bash command), </a:t>
-            </a:r>
-            <a:r>
-              <a:rPr lang="en-US" dirty="0" smtClean="0"/>
-              <a:t>and are easily used with python’s package import system.</a:t>
-            </a:r>
-            <a:endParaRPr lang="en-US" dirty="0" smtClean="0"/>
+              <a:t> libraries are easily installed using pip (a terminal/bash command), and are easily used with python’s package import system.</a:t>
+            </a:r>
           </a:p>
         </p:txBody>
       </p:sp>
@@ -5496,11 +5441,7 @@
             </a:r>
             <a:r>
               <a:rPr lang="en-US" dirty="0" smtClean="0"/>
-              <a:t> is a tool that sets up a virtual python environment for your project. </a:t>
-            </a:r>
-            <a:r>
-              <a:rPr lang="en-US" dirty="0" smtClean="0"/>
-              <a:t>We use </a:t>
+              <a:t> is a tool that sets up a virtual python environment for your project. We use </a:t>
             </a:r>
             <a:r>
               <a:rPr lang="en-US" dirty="0" err="1" smtClean="0"/>
@@ -5508,31 +5449,7 @@
             </a:r>
             <a:r>
               <a:rPr lang="en-US" dirty="0" smtClean="0"/>
-              <a:t> </a:t>
-            </a:r>
-            <a:r>
-              <a:rPr lang="en-US" dirty="0" smtClean="0"/>
-              <a:t>to </a:t>
-            </a:r>
-            <a:r>
-              <a:rPr lang="en-US" dirty="0" smtClean="0"/>
-              <a:t>avoid </a:t>
-            </a:r>
-            <a:r>
-              <a:rPr lang="en-US" dirty="0" smtClean="0"/>
-              <a:t>modifying the </a:t>
-            </a:r>
-            <a:r>
-              <a:rPr lang="en-US" dirty="0" smtClean="0"/>
-              <a:t>libraries </a:t>
-            </a:r>
-            <a:r>
-              <a:rPr lang="en-US" dirty="0" smtClean="0"/>
-              <a:t>that run natively </a:t>
-            </a:r>
-            <a:r>
-              <a:rPr lang="en-US" dirty="0" smtClean="0"/>
-              <a:t>on your computer. We don’t want to create conflicting changes to the python setup of your computer because some of your programs rely on the standard setup. </a:t>
+              <a:t> to avoid modifying the libraries that run natively on your computer. We don’t want to create conflicting changes to the python setup of your computer because some of your programs rely on the standard setup. </a:t>
             </a:r>
           </a:p>
           <a:p>
@@ -5694,13 +5611,8 @@
             </a:r>
             <a:r>
               <a:rPr lang="en-US" dirty="0" smtClean="0"/>
-              <a:t>. Run “$ brew install python3”. If it says you already have it, upgrade it with “$ brew upgrade python3”. If there’s no upgrade, don’t worry about it. Note that python3 includes </a:t>
-            </a:r>
-            <a:r>
-              <a:rPr lang="en-US" dirty="0" smtClean="0"/>
-              <a:t>pip3.</a:t>
-            </a:r>
-            <a:endParaRPr lang="en-US" dirty="0" smtClean="0"/>
+              <a:t>. Run “$ brew install python3”. If it says you already have it, upgrade it with “$ brew upgrade python3”. If there’s no upgrade, don’t worry about it. Note that python3 includes pip3.</a:t>
+            </a:r>
           </a:p>
           <a:p>
             <a:pPr marL="514350" indent="-514350">
@@ -5733,35 +5645,7 @@
             </a:r>
             <a:r>
               <a:rPr lang="en-US" dirty="0" smtClean="0"/>
-              <a:t>”. </a:t>
-            </a:r>
-            <a:r>
-              <a:rPr lang="en-US" dirty="0" smtClean="0"/>
-              <a:t>You might </a:t>
-            </a:r>
-            <a:r>
-              <a:rPr lang="en-US" dirty="0" smtClean="0"/>
-              <a:t>be asked to enter your password (which </a:t>
-            </a:r>
-            <a:r>
-              <a:rPr lang="en-US" dirty="0" smtClean="0"/>
-              <a:t>won’t show </a:t>
-            </a:r>
-            <a:r>
-              <a:rPr lang="en-US" dirty="0" smtClean="0"/>
-              <a:t>on the </a:t>
-            </a:r>
-            <a:r>
-              <a:rPr lang="en-US" dirty="0" smtClean="0"/>
-              <a:t>screen). </a:t>
-            </a:r>
-            <a:r>
-              <a:rPr lang="en-US" dirty="0" smtClean="0"/>
-              <a:t>Hit </a:t>
-            </a:r>
-            <a:r>
-              <a:rPr lang="en-US" dirty="0" smtClean="0"/>
-              <a:t>enter after typing it.</a:t>
+              <a:t>”. You might be asked to enter your password (which won’t show on the screen). Hit enter after typing it.</a:t>
             </a:r>
             <a:endParaRPr lang="en-US" b="1" dirty="0" smtClean="0"/>
           </a:p>
@@ -5876,7 +5760,9 @@
               <a:t>Download the </a:t>
             </a:r>
             <a:r>
-              <a:rPr lang="en-US" sz="2400" i="1" dirty="0" smtClean="0"/>
+              <a:rPr lang="en-US" sz="2400" dirty="0" smtClean="0">
+                <a:hlinkClick r:id="rId2"/>
+              </a:rPr>
               <a:t>starter code</a:t>
             </a:r>
             <a:r>
@@ -5891,15 +5777,7 @@
             </a:pPr>
             <a:r>
               <a:rPr lang="en-US" sz="2400" dirty="0" smtClean="0"/>
-              <a:t>Navigate into the </a:t>
-            </a:r>
-            <a:r>
-              <a:rPr lang="en-US" sz="2400" dirty="0" smtClean="0"/>
-              <a:t>hello-flask folder </a:t>
-            </a:r>
-            <a:r>
-              <a:rPr lang="en-US" sz="2400" dirty="0" smtClean="0"/>
-              <a:t>in terminal.</a:t>
+              <a:t>Navigate into the hello-flask folder in terminal.</a:t>
             </a:r>
           </a:p>
           <a:p>
@@ -5960,11 +5838,7 @@
             </a:r>
             <a:r>
               <a:rPr lang="en-US" sz="2400" dirty="0" smtClean="0"/>
-              <a:t>: </a:t>
-            </a:r>
-            <a:r>
-              <a:rPr lang="en-US" sz="2400" dirty="0" smtClean="0"/>
-              <a:t>$ source </a:t>
+              <a:t>: $ source </a:t>
             </a:r>
             <a:r>
               <a:rPr lang="en-US" sz="2400" dirty="0" err="1" smtClean="0"/>
@@ -6007,11 +5881,7 @@
             </a:pPr>
             <a:r>
               <a:rPr lang="en-US" sz="2400" dirty="0" smtClean="0"/>
-              <a:t>	$ </a:t>
-            </a:r>
-            <a:r>
-              <a:rPr lang="en-US" sz="2400" dirty="0" smtClean="0"/>
-              <a:t>pip install </a:t>
+              <a:t>	$ pip install </a:t>
             </a:r>
             <a:r>
               <a:rPr lang="mr-IN" sz="2400" dirty="0" smtClean="0"/>
@@ -6084,21 +5954,14 @@
             </a:r>
             <a:r>
               <a:rPr lang="en-US" sz="2400" dirty="0" smtClean="0">
-                <a:hlinkClick r:id="rId2"/>
+                <a:hlinkClick r:id="rId3"/>
               </a:rPr>
-              <a:t>http://</a:t>
-            </a:r>
-            <a:r>
-              <a:rPr lang="en-US" sz="2400" dirty="0" smtClean="0">
-                <a:hlinkClick r:id="rId2"/>
-              </a:rPr>
-              <a:t>localhost:5000/hi</a:t>
+              <a:t>http://localhost:5000/hi</a:t>
             </a:r>
             <a:r>
               <a:rPr lang="en-US" sz="2400" dirty="0" smtClean="0"/>
               <a:t>. It should say hello, world!</a:t>
             </a:r>
-            <a:endParaRPr lang="en-US" sz="2400" dirty="0" smtClean="0"/>
           </a:p>
           <a:p>
             <a:pPr marL="514350" indent="-514350">
@@ -6107,13 +5970,8 @@
             </a:pPr>
             <a:r>
               <a:rPr lang="en-US" sz="2400" dirty="0" smtClean="0"/>
-              <a:t>To stop flask in your terminal, hit </a:t>
-            </a:r>
-            <a:r>
-              <a:rPr lang="en-US" sz="2400" dirty="0" smtClean="0"/>
-              <a:t>control-c*</a:t>
-            </a:r>
-            <a:endParaRPr lang="en-US" sz="2400" dirty="0" smtClean="0"/>
+              <a:t>To stop flask in your terminal, hit control-c*</a:t>
+            </a:r>
           </a:p>
           <a:p>
             <a:pPr marL="0" indent="0">
@@ -6143,15 +6001,7 @@
             </a:r>
             <a:r>
               <a:rPr lang="en-US" sz="2400" dirty="0" smtClean="0"/>
-              <a:t> before leaving the </a:t>
-            </a:r>
-            <a:r>
-              <a:rPr lang="en-US" sz="2400" dirty="0" smtClean="0"/>
-              <a:t>folder (at the end of this exercise) </a:t>
-            </a:r>
-            <a:r>
-              <a:rPr lang="en-US" sz="2400" dirty="0" smtClean="0"/>
-              <a:t>so that you don’t accidentally use the wrong </a:t>
+              <a:t> before leaving the folder (at the end of this exercise) so that you don’t accidentally use the wrong </a:t>
             </a:r>
             <a:r>
               <a:rPr lang="en-US" sz="2400" dirty="0" err="1" smtClean="0"/>
@@ -6159,15 +6009,7 @@
             </a:r>
             <a:r>
               <a:rPr lang="en-US" sz="2400" dirty="0" smtClean="0"/>
-              <a:t> some other time. This can be done </a:t>
-            </a:r>
-            <a:r>
-              <a:rPr lang="en-US" sz="2400" dirty="0" smtClean="0"/>
-              <a:t>with </a:t>
-            </a:r>
-            <a:r>
-              <a:rPr lang="en-US" sz="2400" dirty="0" smtClean="0"/>
-              <a:t>$ deactivate </a:t>
+              <a:t> some other time. This can be done with $ deactivate </a:t>
             </a:r>
           </a:p>
           <a:p>
@@ -6313,11 +6155,7 @@
             </a:pPr>
             <a:r>
               <a:rPr lang="en-US" dirty="0" smtClean="0"/>
-              <a:t>Now</a:t>
-            </a:r>
-            <a:r>
-              <a:rPr lang="en-US" dirty="0" smtClean="0"/>
-              <a:t>, go back to slide #11 and make those exercises be sent to a webpage instead of be printed.</a:t>
+              <a:t>Now, go back to slide #11 and make those exercises be sent to a webpage instead of be printed.</a:t>
             </a:r>
           </a:p>
           <a:p>
@@ -6426,11 +6264,7 @@
           <a:p>
             <a:r>
               <a:rPr lang="en-US" dirty="0" smtClean="0"/>
-              <a:t>A real website has more complicated behavior, and usually depends on stored data. Databases can be a pain to setup, so for this we are going to use a learning database </a:t>
-            </a:r>
-            <a:r>
-              <a:rPr lang="en-US" dirty="0" smtClean="0"/>
-              <a:t>called </a:t>
+              <a:t>A real website has more complicated behavior, and usually depends on stored data. Databases can be a pain to setup, so for this we are going to use a learning database called </a:t>
             </a:r>
             <a:r>
               <a:rPr lang="en-US" dirty="0" err="1" smtClean="0"/>
@@ -6438,11 +6272,7 @@
             </a:r>
             <a:r>
               <a:rPr lang="en-US" dirty="0" smtClean="0"/>
-              <a:t> that </a:t>
-            </a:r>
-            <a:r>
-              <a:rPr lang="en-US" dirty="0" smtClean="0"/>
-              <a:t>resembles a real database.</a:t>
+              <a:t> that resembles a real database.</a:t>
             </a:r>
           </a:p>
           <a:p>
@@ -6455,7 +6285,17 @@
             </a:pPr>
             <a:r>
               <a:rPr lang="en-US" dirty="0" smtClean="0"/>
-              <a:t>Download the starter code for </a:t>
+              <a:t>Download the </a:t>
+            </a:r>
+            <a:r>
+              <a:rPr lang="en-US" dirty="0" smtClean="0">
+                <a:hlinkClick r:id="rId2"/>
+              </a:rPr>
+              <a:t>starter code</a:t>
+            </a:r>
+            <a:r>
+              <a:rPr lang="en-US" dirty="0" smtClean="0"/>
+              <a:t> for </a:t>
             </a:r>
             <a:r>
               <a:rPr lang="en-US" i="1" dirty="0" smtClean="0"/>
@@ -6489,7 +6329,6 @@
               <a:rPr lang="en-US" dirty="0" smtClean="0"/>
               <a:t>.</a:t>
             </a:r>
-            <a:endParaRPr lang="en-US" dirty="0" smtClean="0"/>
           </a:p>
           <a:p>
             <a:pPr marL="514350" indent="-514350">
@@ -6506,17 +6345,8 @@
             </a:r>
             <a:r>
               <a:rPr lang="en-US" dirty="0" smtClean="0"/>
-              <a:t>, look </a:t>
-            </a:r>
-            <a:r>
-              <a:rPr lang="en-US" dirty="0" smtClean="0"/>
-              <a:t>at the comments and figure out how to store incoming names &amp; ice cream preferences. </a:t>
-            </a:r>
-            <a:r>
-              <a:rPr lang="en-US" dirty="0" smtClean="0"/>
-              <a:t>(Labelled Part One)</a:t>
-            </a:r>
-            <a:endParaRPr lang="en-US" dirty="0" smtClean="0"/>
+              <a:t>, look at the comments and figure out how to store incoming names &amp; ice cream preferences. (Labelled Part One)</a:t>
+            </a:r>
           </a:p>
           <a:p>
             <a:pPr lvl="1"/>
@@ -6526,27 +6356,7 @@
             </a:r>
             <a:r>
               <a:rPr lang="en-US" dirty="0" smtClean="0"/>
-              <a:t>: you need </a:t>
-            </a:r>
-            <a:r>
-              <a:rPr lang="en-US" dirty="0" smtClean="0"/>
-              <a:t>to again go </a:t>
-            </a:r>
-            <a:r>
-              <a:rPr lang="en-US" dirty="0" smtClean="0"/>
-              <a:t>through the setup process for </a:t>
-            </a:r>
-            <a:r>
-              <a:rPr lang="en-US" dirty="0" smtClean="0"/>
-              <a:t>a new </a:t>
-            </a:r>
-            <a:r>
-              <a:rPr lang="en-US" dirty="0" smtClean="0"/>
-              <a:t>flask app</a:t>
-            </a:r>
-            <a:r>
-              <a:rPr lang="en-US" dirty="0" smtClean="0"/>
-              <a:t>. Note that your executable file is now </a:t>
+              <a:t>: you need to again go through the setup process for a new flask app. Note that your executable file is now </a:t>
             </a:r>
             <a:r>
               <a:rPr lang="en-US" dirty="0" err="1" smtClean="0"/>
@@ -7074,11 +6884,7 @@
           <a:p>
             <a:r>
               <a:rPr lang="en-US" dirty="0" smtClean="0"/>
-              <a:t>When I define things, I’m going to leave out a lot. This is because web development has a lot of crap going on and details often don’t matter to someone learning. Things are going to be </a:t>
-            </a:r>
-            <a:r>
-              <a:rPr lang="en-US" dirty="0" smtClean="0"/>
-              <a:t>oversimplified.</a:t>
+              <a:t>When I define things, I’m going to leave out a lot. This is because web development has a lot of crap going on and details often don’t matter to someone learning. Things are going to be oversimplified.</a:t>
             </a:r>
           </a:p>
           <a:p>
@@ -7605,15 +7411,7 @@
             </a:pPr>
             <a:r>
               <a:rPr lang="en-US" dirty="0" smtClean="0"/>
-              <a:t>Notice that python does not use static </a:t>
-            </a:r>
-            <a:r>
-              <a:rPr lang="en-US" dirty="0" smtClean="0"/>
-              <a:t>types. This means you </a:t>
-            </a:r>
-            <a:r>
-              <a:rPr lang="en-US" dirty="0" smtClean="0"/>
-              <a:t>don’t have to define that a string is a string or that an </a:t>
+              <a:t>Notice that python does not use static types. This means you don’t have to define that a string is a string or that an </a:t>
             </a:r>
             <a:r>
               <a:rPr lang="en-US" dirty="0" err="1" smtClean="0"/>

</xml_diff>